<commit_message>
Added class 6 pre-slides.
</commit_message>
<xml_diff>
--- a/class_5/jquery_class_5.pptx
+++ b/class_5/jquery_class_5.pptx
@@ -305,7 +305,7 @@
           <a:p>
             <a:fld id="{BD797925-1E77-C94E-9BED-1D787524DC63}" type="datetimeFigureOut">
               <a:rPr lang="en-US" smtClean="0"/>
-              <a:t>6/12/12</a:t>
+              <a:t>6/14/12</a:t>
             </a:fld>
             <a:endParaRPr lang="en-US"/>
           </a:p>
@@ -475,7 +475,7 @@
           <a:p>
             <a:fld id="{BD797925-1E77-C94E-9BED-1D787524DC63}" type="datetimeFigureOut">
               <a:rPr lang="en-US" smtClean="0"/>
-              <a:t>6/12/12</a:t>
+              <a:t>6/14/12</a:t>
             </a:fld>
             <a:endParaRPr lang="en-US"/>
           </a:p>
@@ -655,7 +655,7 @@
           <a:p>
             <a:fld id="{BD797925-1E77-C94E-9BED-1D787524DC63}" type="datetimeFigureOut">
               <a:rPr lang="en-US" smtClean="0"/>
-              <a:t>6/12/12</a:t>
+              <a:t>6/14/12</a:t>
             </a:fld>
             <a:endParaRPr lang="en-US"/>
           </a:p>
@@ -825,7 +825,7 @@
           <a:p>
             <a:fld id="{BD797925-1E77-C94E-9BED-1D787524DC63}" type="datetimeFigureOut">
               <a:rPr lang="en-US" smtClean="0"/>
-              <a:t>6/12/12</a:t>
+              <a:t>6/14/12</a:t>
             </a:fld>
             <a:endParaRPr lang="en-US"/>
           </a:p>
@@ -1071,7 +1071,7 @@
           <a:p>
             <a:fld id="{BD797925-1E77-C94E-9BED-1D787524DC63}" type="datetimeFigureOut">
               <a:rPr lang="en-US" smtClean="0"/>
-              <a:t>6/12/12</a:t>
+              <a:t>6/14/12</a:t>
             </a:fld>
             <a:endParaRPr lang="en-US"/>
           </a:p>
@@ -1359,7 +1359,7 @@
           <a:p>
             <a:fld id="{BD797925-1E77-C94E-9BED-1D787524DC63}" type="datetimeFigureOut">
               <a:rPr lang="en-US" smtClean="0"/>
-              <a:t>6/12/12</a:t>
+              <a:t>6/14/12</a:t>
             </a:fld>
             <a:endParaRPr lang="en-US"/>
           </a:p>
@@ -1781,7 +1781,7 @@
           <a:p>
             <a:fld id="{BD797925-1E77-C94E-9BED-1D787524DC63}" type="datetimeFigureOut">
               <a:rPr lang="en-US" smtClean="0"/>
-              <a:t>6/12/12</a:t>
+              <a:t>6/14/12</a:t>
             </a:fld>
             <a:endParaRPr lang="en-US"/>
           </a:p>
@@ -1899,7 +1899,7 @@
           <a:p>
             <a:fld id="{BD797925-1E77-C94E-9BED-1D787524DC63}" type="datetimeFigureOut">
               <a:rPr lang="en-US" smtClean="0"/>
-              <a:t>6/12/12</a:t>
+              <a:t>6/14/12</a:t>
             </a:fld>
             <a:endParaRPr lang="en-US"/>
           </a:p>
@@ -1994,7 +1994,7 @@
           <a:p>
             <a:fld id="{EABE534D-49C6-0343-AD7C-64FB1AF7509D}" type="datetimeFigureOut">
               <a:rPr lang="en-US" smtClean="0"/>
-              <a:t>6/12/12</a:t>
+              <a:t>6/14/12</a:t>
             </a:fld>
             <a:endParaRPr lang="en-US"/>
           </a:p>
@@ -2271,7 +2271,7 @@
           <a:p>
             <a:fld id="{BD797925-1E77-C94E-9BED-1D787524DC63}" type="datetimeFigureOut">
               <a:rPr lang="en-US" smtClean="0"/>
-              <a:t>6/12/12</a:t>
+              <a:t>6/14/12</a:t>
             </a:fld>
             <a:endParaRPr lang="en-US"/>
           </a:p>
@@ -2524,7 +2524,7 @@
           <a:p>
             <a:fld id="{BD797925-1E77-C94E-9BED-1D787524DC63}" type="datetimeFigureOut">
               <a:rPr lang="en-US" smtClean="0"/>
-              <a:t>6/12/12</a:t>
+              <a:t>6/14/12</a:t>
             </a:fld>
             <a:endParaRPr lang="en-US"/>
           </a:p>
@@ -2737,7 +2737,7 @@
           <a:p>
             <a:fld id="{BD797925-1E77-C94E-9BED-1D787524DC63}" type="datetimeFigureOut">
               <a:rPr lang="en-US" smtClean="0"/>
-              <a:t>6/12/12</a:t>
+              <a:t>6/14/12</a:t>
             </a:fld>
             <a:endParaRPr lang="en-US"/>
           </a:p>
@@ -3137,7 +3137,11 @@
             </a:r>
             <a:r>
               <a:rPr lang="en-US" dirty="0" smtClean="0"/>
-              <a:t>– Class 4</a:t>
+              <a:t>– </a:t>
+            </a:r>
+            <a:r>
+              <a:rPr lang="en-US" dirty="0" smtClean="0"/>
+              <a:t>Class 5</a:t>
             </a:r>
             <a:endParaRPr lang="en-US" dirty="0"/>
           </a:p>
@@ -3175,7 +3179,6 @@
               <a:rPr lang="en-US" dirty="0" smtClean="0"/>
               <a:t>AJAX</a:t>
             </a:r>
-            <a:endParaRPr lang="en-US" dirty="0" smtClean="0"/>
           </a:p>
         </p:txBody>
       </p:sp>
@@ -3574,11 +3577,7 @@
             </a:r>
             <a:r>
               <a:rPr lang="en-US" sz="2000" dirty="0" smtClean="0"/>
-              <a:t>unction() { </a:t>
-            </a:r>
-            <a:r>
-              <a:rPr lang="en-US" sz="2000" dirty="0" smtClean="0"/>
-              <a:t>}</a:t>
+              <a:t>unction() { }</a:t>
             </a:r>
           </a:p>
           <a:p>
@@ -4337,7 +4336,6 @@
               <a:rPr lang="en-US" dirty="0" smtClean="0"/>
               <a:t>post</a:t>
             </a:r>
-            <a:endParaRPr lang="en-US" dirty="0" smtClean="0"/>
           </a:p>
         </p:txBody>
       </p:sp>
@@ -4490,7 +4488,6 @@
               <a:rPr lang="en-US" dirty="0"/>
               <a:t>')</a:t>
             </a:r>
-            <a:endParaRPr lang="en-US" dirty="0"/>
           </a:p>
         </p:txBody>
       </p:sp>
@@ -4652,7 +4649,6 @@
               <a:rPr lang="en-US" dirty="0"/>
               <a:t>')</a:t>
             </a:r>
-            <a:endParaRPr lang="en-US" dirty="0"/>
           </a:p>
         </p:txBody>
       </p:sp>
@@ -4879,7 +4875,6 @@
               <a:rPr lang="en-US" dirty="0" smtClean="0"/>
               <a:t>Alternative to XML</a:t>
             </a:r>
-            <a:endParaRPr lang="en-US" dirty="0" smtClean="0"/>
           </a:p>
         </p:txBody>
       </p:sp>
@@ -6055,11 +6050,7 @@
             </a:pPr>
             <a:r>
               <a:rPr lang="en-US" sz="2000" dirty="0" smtClean="0"/>
-              <a:t>{ person: </a:t>
-            </a:r>
-            <a:r>
-              <a:rPr lang="en-US" sz="2000" dirty="0" smtClean="0"/>
-              <a:t>{</a:t>
+              <a:t>{ person: {</a:t>
             </a:r>
           </a:p>
           <a:p>
@@ -6113,7 +6104,6 @@
               <a:rPr lang="en-US" sz="2000" dirty="0" smtClean="0"/>
               <a:t>” </a:t>
             </a:r>
-            <a:endParaRPr lang="en-US" sz="2000" dirty="0" smtClean="0"/>
           </a:p>
           <a:p>
             <a:pPr marL="0" indent="0">
@@ -6124,7 +6114,6 @@
               <a:rPr lang="en-US" sz="2000" dirty="0" smtClean="0"/>
               <a:t>}</a:t>
             </a:r>
-            <a:endParaRPr lang="en-US" sz="2000" dirty="0" smtClean="0"/>
           </a:p>
         </p:txBody>
       </p:sp>
@@ -6392,7 +6381,6 @@
               <a:rPr lang="en-US" sz="2000" dirty="0" smtClean="0"/>
               <a:t>]}</a:t>
             </a:r>
-            <a:endParaRPr lang="en-US" sz="2000" dirty="0" smtClean="0"/>
           </a:p>
         </p:txBody>
       </p:sp>
@@ -7744,11 +7732,7 @@
             </a:r>
             <a:r>
               <a:rPr lang="en-US" sz="2000" dirty="0" smtClean="0"/>
-              <a:t> = { person: </a:t>
-            </a:r>
-            <a:r>
-              <a:rPr lang="en-US" sz="2000" dirty="0" smtClean="0"/>
-              <a:t>{</a:t>
+              <a:t> = { person: {</a:t>
             </a:r>
           </a:p>
           <a:p>
@@ -7802,7 +7786,6 @@
               <a:rPr lang="en-US" sz="2000" dirty="0" smtClean="0"/>
               <a:t>” </a:t>
             </a:r>
-            <a:endParaRPr lang="en-US" sz="2000" dirty="0" smtClean="0"/>
           </a:p>
           <a:p>
             <a:pPr marL="0" indent="0">
@@ -7813,7 +7796,6 @@
               <a:rPr lang="en-US" sz="2000" dirty="0" smtClean="0"/>
               <a:t>}</a:t>
             </a:r>
-            <a:endParaRPr lang="en-US" sz="2000" dirty="0" smtClean="0"/>
           </a:p>
         </p:txBody>
       </p:sp>
@@ -8085,7 +8067,6 @@
               <a:rPr lang="en-US" sz="2000" dirty="0" smtClean="0"/>
               <a:t>]}</a:t>
             </a:r>
-            <a:endParaRPr lang="en-US" sz="2000" dirty="0" smtClean="0"/>
           </a:p>
         </p:txBody>
       </p:sp>
@@ -9065,7 +9046,6 @@
               <a:rPr lang="en-US" dirty="0" smtClean="0"/>
               <a:t>Put simply: requests to the server to receive or post information (Client side!) </a:t>
             </a:r>
-            <a:endParaRPr lang="en-US" dirty="0" smtClean="0"/>
           </a:p>
           <a:p>
             <a:r>
@@ -9074,13 +9054,8 @@
             </a:r>
             <a:r>
               <a:rPr lang="en-US" dirty="0" smtClean="0"/>
-              <a:t> makes AJAX requests easy(</a:t>
-            </a:r>
-            <a:r>
-              <a:rPr lang="en-US" dirty="0" smtClean="0"/>
-              <a:t>easier)</a:t>
-            </a:r>
-            <a:endParaRPr lang="en-US" dirty="0" smtClean="0"/>
+              <a:t> makes AJAX requests easy(easier)</a:t>
+            </a:r>
           </a:p>
           <a:p>
             <a:r>
@@ -9179,7 +9154,6 @@
               <a:rPr lang="en-US" dirty="0" smtClean="0"/>
               <a:t>Server responds with data</a:t>
             </a:r>
-            <a:endParaRPr lang="en-US" dirty="0" smtClean="0"/>
           </a:p>
         </p:txBody>
       </p:sp>

</xml_diff>